<commit_message>
Bug fixes -slide cloning -slide buttons references Additions -Oracle DS
</commit_message>
<xml_diff>
--- a/name.pptx
+++ b/name.pptx
@@ -3061,106 +3061,88 @@
       </p:grpSpPr>
       <p:sp xmlns:r="http://schemas.openxmlformats.org/officeDocument/2006/relationships">
         <p:nvSpPr>
-          <p:cNvPr id="10" name="Zástupný symbol pro obsah 2"/>
-          <p:cNvSpPr>
-            <a:spLocks noGrp="1"/>
-          </p:cNvSpPr>
-          <p:nvPr>
-            <p:ph hasCustomPrompt="1" idx="10"/>
-          </p:nvPr>
-        </p:nvSpPr>
-        <p:spPr>
-          <a:xfrm>
-            <a:off x="292100" y="1687513"/>
-            <a:ext cx="8837365" cy="4710112"/>
-          </a:xfrm>
-        </p:spPr>
-        <p:txBody>
-          <a:bodyPr/>
-          <a:lstStyle>
-            <a:lvl1pPr indent="0" marL="0">
-              <a:buFont charset="0" pitchFamily="34" typeface="Arial"/>
-              <a:buNone/>
-              <a:defRPr baseline="0"/>
-            </a:lvl1pPr>
-          </a:lstStyle>
+          <p:cNvPr id="2" name="Title 1">
+            <a:extLst>
+              <a:ext uri="{FF2B5EF4-FFF2-40B4-BE49-F238E27FC236}">
+                <a16:creationId xmlns:a16="http://schemas.microsoft.com/office/drawing/2014/main" id="{D9BC5DC7-4F5D-4F84-BD10-E78B3EB5262B}"/>
+              </a:ext>
+            </a:extLst>
+          </p:cNvPr>
+          <p:cNvSpPr>
+            <a:spLocks noGrp="1"/>
+          </p:cNvSpPr>
+          <p:nvPr>
+            <p:ph type="title"/>
+          </p:nvPr>
+        </p:nvSpPr>
+        <p:spPr/>
+        <p:txBody>
+          <a:bodyPr/>
+          <a:lstStyle/>
+          <a:p>
+            <a:r>
+              <a:rPr lang="en-US"/>
+              <a:t>Click to edit Master title style</a:t>
+            </a:r>
+            <a:endParaRPr lang="sk-SK"/>
+          </a:p>
+        </p:txBody>
+      </p:sp>
+      <p:sp xmlns:r="http://schemas.openxmlformats.org/officeDocument/2006/relationships">
+        <p:nvSpPr>
+          <p:cNvPr id="3" name="Content Placeholder 2">
+            <a:extLst>
+              <a:ext uri="{FF2B5EF4-FFF2-40B4-BE49-F238E27FC236}">
+                <a16:creationId xmlns:a16="http://schemas.microsoft.com/office/drawing/2014/main" id="{C620C46B-7EEC-40BA-B377-600776741F47}"/>
+              </a:ext>
+            </a:extLst>
+          </p:cNvPr>
+          <p:cNvSpPr>
+            <a:spLocks noGrp="1"/>
+          </p:cNvSpPr>
+          <p:nvPr>
+            <p:ph idx="1"/>
+          </p:nvPr>
+        </p:nvSpPr>
+        <p:spPr/>
+        <p:txBody>
+          <a:bodyPr/>
+          <a:lstStyle/>
           <a:p>
             <a:pPr lvl="0"/>
             <a:r>
-              <a:rPr dirty="0" lang="en-US" smtClean="0"/>
-              <a:t>Graph 1</a:t>
-            </a:r>
-            <a:endParaRPr dirty="0" lang="cs-CZ"/>
-          </a:p>
-        </p:txBody>
-      </p:sp>
-      <p:sp xmlns:r="http://schemas.openxmlformats.org/officeDocument/2006/relationships">
-        <p:nvSpPr>
-          <p:cNvPr id="11" name="Nadpis 1"/>
-          <p:cNvSpPr>
-            <a:spLocks noGrp="1"/>
-          </p:cNvSpPr>
-          <p:nvPr>
-            <p:ph hasCustomPrompt="1" type="title"/>
-          </p:nvPr>
-        </p:nvSpPr>
-        <p:spPr>
-          <a:xfrm>
-            <a:off x="2576737" y="167682"/>
-            <a:ext cx="6552728" cy="909639"/>
-          </a:xfrm>
-        </p:spPr>
-        <p:txBody>
-          <a:bodyPr/>
-          <a:lstStyle>
-            <a:lvl1pPr>
-              <a:defRPr/>
-            </a:lvl1pPr>
-          </a:lstStyle>
-          <a:p>
-            <a:r>
-              <a:rPr dirty="0" lang="en-US" smtClean="0"/>
-              <a:t>Master Title</a:t>
-            </a:r>
-            <a:endParaRPr dirty="0" lang="cs-CZ"/>
-          </a:p>
-        </p:txBody>
-      </p:sp>
-      <p:sp xmlns:r="http://schemas.openxmlformats.org/officeDocument/2006/relationships">
-        <p:nvSpPr>
-          <p:cNvPr id="6" name="Text Placeholder 2"/>
-          <p:cNvSpPr>
-            <a:spLocks noGrp="1"/>
-          </p:cNvSpPr>
-          <p:nvPr>
-            <p:ph hasCustomPrompt="1" idx="15" sz="quarter" type="body"/>
-          </p:nvPr>
-        </p:nvSpPr>
-        <p:spPr>
-          <a:xfrm>
-            <a:off x="292099" y="1317625"/>
-            <a:ext cx="8837365" cy="369888"/>
-          </a:xfrm>
-        </p:spPr>
-        <p:txBody>
-          <a:bodyPr/>
-          <a:lstStyle>
-            <a:lvl1pPr indent="0" marL="0">
-              <a:buNone/>
-              <a:defRPr b="0" sz="1800" u="none">
-                <a:solidFill>
-                  <a:schemeClr val="tx1"/>
-                </a:solidFill>
-              </a:defRPr>
-            </a:lvl1pPr>
-          </a:lstStyle>
-          <a:p>
-            <a:pPr lvl="0"/>
-            <a:r>
-              <a:rPr dirty="0" lang="en-US" smtClean="0"/>
-              <a:t>Title 1</a:t>
-            </a:r>
-            <a:endParaRPr dirty="0" lang="en-US"/>
+              <a:rPr lang="en-US"/>
+              <a:t>Edit Master text styles</a:t>
+            </a:r>
+          </a:p>
+          <a:p>
+            <a:pPr lvl="1"/>
+            <a:r>
+              <a:rPr lang="en-US"/>
+              <a:t>Second level</a:t>
+            </a:r>
+          </a:p>
+          <a:p>
+            <a:pPr lvl="2"/>
+            <a:r>
+              <a:rPr lang="en-US"/>
+              <a:t>Third level</a:t>
+            </a:r>
+          </a:p>
+          <a:p>
+            <a:pPr lvl="3"/>
+            <a:r>
+              <a:rPr lang="en-US"/>
+              <a:t>Fourth level</a:t>
+            </a:r>
+          </a:p>
+          <a:p>
+            <a:pPr lvl="4"/>
+            <a:r>
+              <a:rPr lang="en-US"/>
+              <a:t>Fifth level</a:t>
+            </a:r>
+            <a:endParaRPr lang="sk-SK"/>
           </a:p>
         </p:txBody>
       </p:sp>

</xml_diff>